<commit_message>
Agregamos final de trimeste III
</commit_message>
<xml_diff>
--- a/Tercer Trimestre/JINRO ONLINE SHOPING.pptx
+++ b/Tercer Trimestre/JINRO ONLINE SHOPING.pptx
@@ -33,7 +33,12 @@
     <p:sldId id="290" r:id="rId27"/>
     <p:sldId id="291" r:id="rId28"/>
     <p:sldId id="293" r:id="rId29"/>
-    <p:sldId id="262" r:id="rId30"/>
+    <p:sldId id="296" r:id="rId30"/>
+    <p:sldId id="294" r:id="rId31"/>
+    <p:sldId id="295" r:id="rId32"/>
+    <p:sldId id="298" r:id="rId33"/>
+    <p:sldId id="297" r:id="rId34"/>
+    <p:sldId id="262" r:id="rId35"/>
   </p:sldIdLst>
   <p:sldSz cx="9144000" cy="5143500" type="screen16x9"/>
   <p:notesSz cx="6858000" cy="9144000"/>
@@ -320,7 +325,7 @@
           <a:p>
             <a:fld id="{B3030C24-9424-B24A-8613-79990C3AA492}" type="datetimeFigureOut">
               <a:rPr lang="es-ES" smtClean="0"/>
-              <a:t>23/02/2022</a:t>
+              <a:t>01/04/2022</a:t>
             </a:fld>
             <a:endParaRPr lang="es-ES"/>
           </a:p>
@@ -500,7 +505,7 @@
           <a:p>
             <a:fld id="{B3030C24-9424-B24A-8613-79990C3AA492}" type="datetimeFigureOut">
               <a:rPr lang="es-ES" smtClean="0"/>
-              <a:t>23/02/2022</a:t>
+              <a:t>01/04/2022</a:t>
             </a:fld>
             <a:endParaRPr lang="es-ES"/>
           </a:p>
@@ -1137,7 +1142,7 @@
           <a:p>
             <a:fld id="{B3030C24-9424-B24A-8613-79990C3AA492}" type="datetimeFigureOut">
               <a:rPr lang="es-ES" smtClean="0"/>
-              <a:t>23/02/2022</a:t>
+              <a:t>01/04/2022</a:t>
             </a:fld>
             <a:endParaRPr lang="es-ES"/>
           </a:p>
@@ -1390,7 +1395,7 @@
           <a:p>
             <a:fld id="{B3030C24-9424-B24A-8613-79990C3AA492}" type="datetimeFigureOut">
               <a:rPr lang="es-ES" smtClean="0"/>
-              <a:t>23/02/2022</a:t>
+              <a:t>01/04/2022</a:t>
             </a:fld>
             <a:endParaRPr lang="es-ES"/>
           </a:p>
@@ -1603,7 +1608,7 @@
           <a:p>
             <a:fld id="{B3030C24-9424-B24A-8613-79990C3AA492}" type="datetimeFigureOut">
               <a:rPr lang="es-ES" smtClean="0"/>
-              <a:t>23/02/2022</a:t>
+              <a:t>01/04/2022</a:t>
             </a:fld>
             <a:endParaRPr lang="es-ES"/>
           </a:p>
@@ -2114,6 +2119,36 @@
           </a:p>
         </p:txBody>
       </p:sp>
+      <p:pic>
+        <p:nvPicPr>
+          <p:cNvPr id="4" name="Imagen 3">
+            <a:extLst>
+              <a:ext uri="{FF2B5EF4-FFF2-40B4-BE49-F238E27FC236}">
+                <a16:creationId xmlns:a16="http://schemas.microsoft.com/office/drawing/2014/main" id="{242064E1-4965-4EDF-9E09-7ADDCECECF3A}"/>
+              </a:ext>
+            </a:extLst>
+          </p:cNvPr>
+          <p:cNvPicPr>
+            <a:picLocks noChangeAspect="1"/>
+          </p:cNvPicPr>
+          <p:nvPr/>
+        </p:nvPicPr>
+        <p:blipFill>
+          <a:blip r:embed="rId2"/>
+          <a:stretch>
+            <a:fillRect/>
+          </a:stretch>
+        </p:blipFill>
+        <p:spPr>
+          <a:xfrm>
+            <a:off x="5002925" y="3605389"/>
+            <a:ext cx="1723696" cy="613196"/>
+          </a:xfrm>
+          <a:prstGeom prst="rect">
+            <a:avLst/>
+          </a:prstGeom>
+        </p:spPr>
+      </p:pic>
     </p:spTree>
     <p:extLst>
       <p:ext uri="{BB962C8B-B14F-4D97-AF65-F5344CB8AC3E}">
@@ -3428,6 +3463,7 @@
       <p:sp>
         <p:nvSpPr>
           <p:cNvPr id="2" name="CuadroTexto 1">
+            <a:hlinkClick r:id="rId2" action="ppaction://hlinkfile"/>
             <a:extLst>
               <a:ext uri="{FF2B5EF4-FFF2-40B4-BE49-F238E27FC236}">
                 <a16:creationId xmlns:a16="http://schemas.microsoft.com/office/drawing/2014/main" id="{FDDFD374-A885-40C3-A755-A5E383106E09}"/>
@@ -4834,6 +4870,46 @@
           </a:p>
         </p:txBody>
       </p:sp>
+      <p:sp>
+        <p:nvSpPr>
+          <p:cNvPr id="5" name="CuadroTexto 4">
+            <a:hlinkClick r:id="rId2" action="ppaction://hlinkfile"/>
+            <a:extLst>
+              <a:ext uri="{FF2B5EF4-FFF2-40B4-BE49-F238E27FC236}">
+                <a16:creationId xmlns:a16="http://schemas.microsoft.com/office/drawing/2014/main" id="{C3E039BB-AED5-4129-9567-3C8EE10E2E97}"/>
+              </a:ext>
+            </a:extLst>
+          </p:cNvPr>
+          <p:cNvSpPr txBox="1"/>
+          <p:nvPr/>
+        </p:nvSpPr>
+        <p:spPr>
+          <a:xfrm>
+            <a:off x="2759147" y="3430857"/>
+            <a:ext cx="3625702" cy="307777"/>
+          </a:xfrm>
+          <a:prstGeom prst="rect">
+            <a:avLst/>
+          </a:prstGeom>
+          <a:noFill/>
+        </p:spPr>
+        <p:txBody>
+          <a:bodyPr wrap="square" rtlCol="0">
+            <a:spAutoFit/>
+          </a:bodyPr>
+          <a:lstStyle/>
+          <a:p>
+            <a:pPr algn="ctr"/>
+            <a:r>
+              <a:rPr lang="es-CO" sz="1400" dirty="0">
+                <a:hlinkClick r:id="rId2" action="ppaction://hlinkfile"/>
+              </a:rPr>
+              <a:t>Diagrama de BPMN Jinro servicio Bar</a:t>
+            </a:r>
+            <a:endParaRPr lang="es-CO" sz="1400" dirty="0"/>
+          </a:p>
+        </p:txBody>
+      </p:sp>
     </p:spTree>
     <p:extLst>
       <p:ext uri="{BB962C8B-B14F-4D97-AF65-F5344CB8AC3E}">
@@ -5147,6 +5223,45 @@
           </a:p>
         </p:txBody>
       </p:sp>
+      <p:sp>
+        <p:nvSpPr>
+          <p:cNvPr id="5" name="CuadroTexto 4">
+            <a:extLst>
+              <a:ext uri="{FF2B5EF4-FFF2-40B4-BE49-F238E27FC236}">
+                <a16:creationId xmlns:a16="http://schemas.microsoft.com/office/drawing/2014/main" id="{50FE2ED5-380F-413C-830B-5601927DDE82}"/>
+              </a:ext>
+            </a:extLst>
+          </p:cNvPr>
+          <p:cNvSpPr txBox="1"/>
+          <p:nvPr/>
+        </p:nvSpPr>
+        <p:spPr>
+          <a:xfrm>
+            <a:off x="2594342" y="3430857"/>
+            <a:ext cx="3955311" cy="276999"/>
+          </a:xfrm>
+          <a:prstGeom prst="rect">
+            <a:avLst/>
+          </a:prstGeom>
+          <a:noFill/>
+        </p:spPr>
+        <p:txBody>
+          <a:bodyPr wrap="square" rtlCol="0">
+            <a:spAutoFit/>
+          </a:bodyPr>
+          <a:lstStyle/>
+          <a:p>
+            <a:pPr algn="ctr"/>
+            <a:r>
+              <a:rPr lang="es-CO" sz="1200" dirty="0">
+                <a:hlinkClick r:id="rId2"/>
+              </a:rPr>
+              <a:t>CONTROL DE VERSI0NES EN GIT HUB</a:t>
+            </a:r>
+            <a:endParaRPr lang="es-CO" sz="1200" dirty="0"/>
+          </a:p>
+        </p:txBody>
+      </p:sp>
     </p:spTree>
     <p:extLst>
       <p:ext uri="{BB962C8B-B14F-4D97-AF65-F5344CB8AC3E}">
@@ -5460,6 +5575,45 @@
           </a:p>
         </p:txBody>
       </p:sp>
+      <p:sp>
+        <p:nvSpPr>
+          <p:cNvPr id="5" name="CuadroTexto 4">
+            <a:extLst>
+              <a:ext uri="{FF2B5EF4-FFF2-40B4-BE49-F238E27FC236}">
+                <a16:creationId xmlns:a16="http://schemas.microsoft.com/office/drawing/2014/main" id="{6F758146-235C-46AE-94D6-306DF1E8E7DF}"/>
+              </a:ext>
+            </a:extLst>
+          </p:cNvPr>
+          <p:cNvSpPr txBox="1"/>
+          <p:nvPr/>
+        </p:nvSpPr>
+        <p:spPr>
+          <a:xfrm>
+            <a:off x="2335512" y="3081642"/>
+            <a:ext cx="4752754" cy="307777"/>
+          </a:xfrm>
+          <a:prstGeom prst="rect">
+            <a:avLst/>
+          </a:prstGeom>
+          <a:noFill/>
+        </p:spPr>
+        <p:txBody>
+          <a:bodyPr wrap="square" rtlCol="0">
+            <a:spAutoFit/>
+          </a:bodyPr>
+          <a:lstStyle/>
+          <a:p>
+            <a:pPr algn="ctr"/>
+            <a:r>
+              <a:rPr lang="es-CO" sz="1400" dirty="0">
+                <a:hlinkClick r:id="rId2" action="ppaction://hlinkfile"/>
+              </a:rPr>
+              <a:t>DIAGRAMA DE CASOS DE USOS</a:t>
+            </a:r>
+            <a:endParaRPr lang="es-CO" sz="1400" dirty="0"/>
+          </a:p>
+        </p:txBody>
+      </p:sp>
     </p:spTree>
     <p:extLst>
       <p:ext uri="{BB962C8B-B14F-4D97-AF65-F5344CB8AC3E}">
@@ -5597,6 +5751,45 @@
           </a:p>
         </p:txBody>
       </p:sp>
+      <p:sp>
+        <p:nvSpPr>
+          <p:cNvPr id="5" name="CuadroTexto 4">
+            <a:extLst>
+              <a:ext uri="{FF2B5EF4-FFF2-40B4-BE49-F238E27FC236}">
+                <a16:creationId xmlns:a16="http://schemas.microsoft.com/office/drawing/2014/main" id="{2B896BD4-E32B-4867-8723-0784DB1DADCB}"/>
+              </a:ext>
+            </a:extLst>
+          </p:cNvPr>
+          <p:cNvSpPr txBox="1"/>
+          <p:nvPr/>
+        </p:nvSpPr>
+        <p:spPr>
+          <a:xfrm>
+            <a:off x="2335512" y="3081642"/>
+            <a:ext cx="4752754" cy="307777"/>
+          </a:xfrm>
+          <a:prstGeom prst="rect">
+            <a:avLst/>
+          </a:prstGeom>
+          <a:noFill/>
+        </p:spPr>
+        <p:txBody>
+          <a:bodyPr wrap="square" rtlCol="0">
+            <a:spAutoFit/>
+          </a:bodyPr>
+          <a:lstStyle/>
+          <a:p>
+            <a:pPr algn="ctr"/>
+            <a:r>
+              <a:rPr lang="es-CO" sz="1400" dirty="0">
+                <a:hlinkClick r:id="rId2" action="ppaction://hlinkfile"/>
+              </a:rPr>
+              <a:t>DIAGRAMA DE CASOS DE USO EXTENDIDO</a:t>
+            </a:r>
+            <a:endParaRPr lang="es-CO" sz="1400" dirty="0"/>
+          </a:p>
+        </p:txBody>
+      </p:sp>
     </p:spTree>
     <p:extLst>
       <p:ext uri="{BB962C8B-B14F-4D97-AF65-F5344CB8AC3E}">
@@ -5748,7 +5941,7 @@
         </p:nvSpPr>
         <p:spPr>
           <a:xfrm>
-            <a:off x="2339161" y="3173535"/>
+            <a:off x="2339161" y="2737847"/>
             <a:ext cx="4465674" cy="307777"/>
           </a:xfrm>
           <a:prstGeom prst="rect">
@@ -5767,7 +5960,7 @@
               <a:rPr lang="es-CO" sz="1400" dirty="0">
                 <a:hlinkClick r:id="rId2" action="ppaction://hlinkfile"/>
               </a:rPr>
-              <a:t>Ver modelo entidad relación</a:t>
+              <a:t>MODELO ENTIDAD RELACION</a:t>
             </a:r>
             <a:endParaRPr lang="es-CO" sz="1400" dirty="0"/>
           </a:p>
@@ -5910,6 +6103,45 @@
           </a:p>
         </p:txBody>
       </p:sp>
+      <p:sp>
+        <p:nvSpPr>
+          <p:cNvPr id="5" name="CuadroTexto 4">
+            <a:extLst>
+              <a:ext uri="{FF2B5EF4-FFF2-40B4-BE49-F238E27FC236}">
+                <a16:creationId xmlns:a16="http://schemas.microsoft.com/office/drawing/2014/main" id="{0575B843-D51E-4C22-BFDC-CD65CD505F78}"/>
+              </a:ext>
+            </a:extLst>
+          </p:cNvPr>
+          <p:cNvSpPr txBox="1"/>
+          <p:nvPr/>
+        </p:nvSpPr>
+        <p:spPr>
+          <a:xfrm>
+            <a:off x="2339161" y="3162436"/>
+            <a:ext cx="4465674" cy="307777"/>
+          </a:xfrm>
+          <a:prstGeom prst="rect">
+            <a:avLst/>
+          </a:prstGeom>
+          <a:noFill/>
+        </p:spPr>
+        <p:txBody>
+          <a:bodyPr wrap="square" rtlCol="0">
+            <a:spAutoFit/>
+          </a:bodyPr>
+          <a:lstStyle/>
+          <a:p>
+            <a:pPr algn="ctr"/>
+            <a:r>
+              <a:rPr lang="es-CO" sz="1400" dirty="0">
+                <a:hlinkClick r:id="rId2" action="ppaction://hlinkfile"/>
+              </a:rPr>
+              <a:t>DIAGRAMA DE GANTT</a:t>
+            </a:r>
+            <a:endParaRPr lang="es-CO" sz="1400" dirty="0"/>
+          </a:p>
+        </p:txBody>
+      </p:sp>
     </p:spTree>
     <p:extLst>
       <p:ext uri="{BB962C8B-B14F-4D97-AF65-F5344CB8AC3E}">
@@ -6061,7 +6293,7 @@
         </p:nvSpPr>
         <p:spPr>
           <a:xfrm>
-            <a:off x="2514599" y="2939753"/>
+            <a:off x="2514599" y="3265407"/>
             <a:ext cx="4114800" cy="307777"/>
           </a:xfrm>
           <a:prstGeom prst="rect">
@@ -6080,7 +6312,7 @@
               <a:rPr lang="es-CO" sz="1400" dirty="0">
                 <a:hlinkClick r:id="rId2" action="ppaction://hlinkfile"/>
               </a:rPr>
-              <a:t>Ver diagrama de clases</a:t>
+              <a:t>DIAGRAMA DE CLASES </a:t>
             </a:r>
             <a:endParaRPr lang="es-CO" sz="1400" dirty="0"/>
           </a:p>
@@ -6128,10 +6360,144 @@
           <a:chExt cx="0" cy="0"/>
         </a:xfrm>
       </p:grpSpPr>
+      <p:sp>
+        <p:nvSpPr>
+          <p:cNvPr id="3" name="CuadroTexto 2">
+            <a:extLst>
+              <a:ext uri="{FF2B5EF4-FFF2-40B4-BE49-F238E27FC236}">
+                <a16:creationId xmlns:a16="http://schemas.microsoft.com/office/drawing/2014/main" id="{F9DF0B84-F293-4628-B89D-1F4622DFECE2}"/>
+              </a:ext>
+            </a:extLst>
+          </p:cNvPr>
+          <p:cNvSpPr txBox="1"/>
+          <p:nvPr/>
+        </p:nvSpPr>
+        <p:spPr>
+          <a:xfrm>
+            <a:off x="1820916" y="169398"/>
+            <a:ext cx="5502166" cy="1323439"/>
+          </a:xfrm>
+          <a:prstGeom prst="rect">
+            <a:avLst/>
+          </a:prstGeom>
+          <a:noFill/>
+        </p:spPr>
+        <p:txBody>
+          <a:bodyPr wrap="square">
+            <a:spAutoFit/>
+          </a:bodyPr>
+          <a:lstStyle/>
+          <a:p>
+            <a:pPr algn="ctr"/>
+            <a:r>
+              <a:rPr lang="es-CO" sz="4000" b="1" dirty="0">
+                <a:solidFill>
+                  <a:schemeClr val="tx1">
+                    <a:lumMod val="75000"/>
+                    <a:lumOff val="25000"/>
+                  </a:schemeClr>
+                </a:solidFill>
+              </a:rPr>
+              <a:t>MOCKUPS/WIREFRAMES JINRO</a:t>
+            </a:r>
+            <a:endParaRPr lang="es-CO" sz="4000" dirty="0"/>
+          </a:p>
+        </p:txBody>
+      </p:sp>
+      <p:sp>
+        <p:nvSpPr>
+          <p:cNvPr id="4" name="Rectángulo 3">
+            <a:extLst>
+              <a:ext uri="{FF2B5EF4-FFF2-40B4-BE49-F238E27FC236}">
+                <a16:creationId xmlns:a16="http://schemas.microsoft.com/office/drawing/2014/main" id="{94A65BCD-E6D4-4144-B7D1-7D0C8FFA6564}"/>
+              </a:ext>
+            </a:extLst>
+          </p:cNvPr>
+          <p:cNvSpPr/>
+          <p:nvPr/>
+        </p:nvSpPr>
+        <p:spPr>
+          <a:xfrm flipV="1">
+            <a:off x="3723701" y="1447118"/>
+            <a:ext cx="1696597" cy="45719"/>
+          </a:xfrm>
+          <a:prstGeom prst="rect">
+            <a:avLst/>
+          </a:prstGeom>
+          <a:solidFill>
+            <a:srgbClr val="FF6600"/>
+          </a:solidFill>
+          <a:ln>
+            <a:noFill/>
+          </a:ln>
+          <a:effectLst/>
+        </p:spPr>
+        <p:style>
+          <a:lnRef idx="1">
+            <a:schemeClr val="accent1"/>
+          </a:lnRef>
+          <a:fillRef idx="3">
+            <a:schemeClr val="accent1"/>
+          </a:fillRef>
+          <a:effectRef idx="2">
+            <a:schemeClr val="accent1"/>
+          </a:effectRef>
+          <a:fontRef idx="minor">
+            <a:schemeClr val="lt1"/>
+          </a:fontRef>
+        </p:style>
+        <p:txBody>
+          <a:bodyPr rtlCol="0" anchor="ctr"/>
+          <a:lstStyle/>
+          <a:p>
+            <a:pPr algn="ctr"/>
+            <a:endParaRPr lang="es-ES"/>
+          </a:p>
+        </p:txBody>
+      </p:sp>
+      <p:sp>
+        <p:nvSpPr>
+          <p:cNvPr id="2" name="CuadroTexto 1">
+            <a:extLst>
+              <a:ext uri="{FF2B5EF4-FFF2-40B4-BE49-F238E27FC236}">
+                <a16:creationId xmlns:a16="http://schemas.microsoft.com/office/drawing/2014/main" id="{085C4C01-85AB-42ED-9FBF-8C70D0B33681}"/>
+              </a:ext>
+            </a:extLst>
+          </p:cNvPr>
+          <p:cNvSpPr txBox="1"/>
+          <p:nvPr/>
+        </p:nvSpPr>
+        <p:spPr>
+          <a:xfrm>
+            <a:off x="2514599" y="3265407"/>
+            <a:ext cx="4114800" cy="307777"/>
+          </a:xfrm>
+          <a:prstGeom prst="rect">
+            <a:avLst/>
+          </a:prstGeom>
+          <a:noFill/>
+        </p:spPr>
+        <p:txBody>
+          <a:bodyPr wrap="square" rtlCol="0">
+            <a:spAutoFit/>
+          </a:bodyPr>
+          <a:lstStyle/>
+          <a:p>
+            <a:pPr algn="ctr"/>
+            <a:r>
+              <a:rPr lang="es-CO" sz="1400" dirty="0">
+                <a:hlinkClick r:id="rId2" action="ppaction://hlinkfile"/>
+              </a:rPr>
+              <a:t>DISEÑO DE MOCKUPS/WIREFRAMES JINRO</a:t>
+            </a:r>
+            <a:endParaRPr lang="es-CO" sz="1400" dirty="0"/>
+          </a:p>
+        </p:txBody>
+      </p:sp>
     </p:spTree>
     <p:extLst>
       <p:ext uri="{BB962C8B-B14F-4D97-AF65-F5344CB8AC3E}">
-        <p14:creationId xmlns:p14="http://schemas.microsoft.com/office/powerpoint/2010/main" val="3181596749"/>
+        <p14:creationId xmlns:p14="http://schemas.microsoft.com/office/powerpoint/2010/main" val="2542866271"/>
       </p:ext>
     </p:extLst>
   </p:cSld>
@@ -6359,6 +6725,752 @@
       <p:bldP spid="3" grpId="0"/>
     </p:bldLst>
   </p:timing>
+</p:sld>
+</file>
+
+<file path=ppt/slides/slide30.xml><?xml version="1.0" encoding="utf-8"?>
+<p:sld xmlns:a="http://schemas.openxmlformats.org/drawingml/2006/main" xmlns:r="http://schemas.openxmlformats.org/officeDocument/2006/relationships" xmlns:p="http://schemas.openxmlformats.org/presentationml/2006/main">
+  <p:cSld>
+    <p:spTree>
+      <p:nvGrpSpPr>
+        <p:cNvPr id="1" name=""/>
+        <p:cNvGrpSpPr/>
+        <p:nvPr/>
+      </p:nvGrpSpPr>
+      <p:grpSpPr>
+        <a:xfrm>
+          <a:off x="0" y="0"/>
+          <a:ext cx="0" cy="0"/>
+          <a:chOff x="0" y="0"/>
+          <a:chExt cx="0" cy="0"/>
+        </a:xfrm>
+      </p:grpSpPr>
+      <p:sp>
+        <p:nvSpPr>
+          <p:cNvPr id="3" name="CuadroTexto 2">
+            <a:extLst>
+              <a:ext uri="{FF2B5EF4-FFF2-40B4-BE49-F238E27FC236}">
+                <a16:creationId xmlns:a16="http://schemas.microsoft.com/office/drawing/2014/main" id="{F9DF0B84-F293-4628-B89D-1F4622DFECE2}"/>
+              </a:ext>
+            </a:extLst>
+          </p:cNvPr>
+          <p:cNvSpPr txBox="1"/>
+          <p:nvPr/>
+        </p:nvSpPr>
+        <p:spPr>
+          <a:xfrm>
+            <a:off x="2286000" y="123679"/>
+            <a:ext cx="4572000" cy="1323439"/>
+          </a:xfrm>
+          <a:prstGeom prst="rect">
+            <a:avLst/>
+          </a:prstGeom>
+          <a:noFill/>
+        </p:spPr>
+        <p:txBody>
+          <a:bodyPr wrap="square">
+            <a:spAutoFit/>
+          </a:bodyPr>
+          <a:lstStyle/>
+          <a:p>
+            <a:pPr algn="ctr"/>
+            <a:r>
+              <a:rPr lang="es-CO" sz="4000" b="1" dirty="0">
+                <a:solidFill>
+                  <a:schemeClr val="tx1">
+                    <a:lumMod val="75000"/>
+                    <a:lumOff val="25000"/>
+                  </a:schemeClr>
+                </a:solidFill>
+              </a:rPr>
+              <a:t>DIAGRAMA RELACIONAL</a:t>
+            </a:r>
+            <a:endParaRPr lang="es-CO" sz="4000" dirty="0"/>
+          </a:p>
+        </p:txBody>
+      </p:sp>
+      <p:sp>
+        <p:nvSpPr>
+          <p:cNvPr id="4" name="Rectángulo 3">
+            <a:extLst>
+              <a:ext uri="{FF2B5EF4-FFF2-40B4-BE49-F238E27FC236}">
+                <a16:creationId xmlns:a16="http://schemas.microsoft.com/office/drawing/2014/main" id="{94A65BCD-E6D4-4144-B7D1-7D0C8FFA6564}"/>
+              </a:ext>
+            </a:extLst>
+          </p:cNvPr>
+          <p:cNvSpPr/>
+          <p:nvPr/>
+        </p:nvSpPr>
+        <p:spPr>
+          <a:xfrm flipV="1">
+            <a:off x="3723701" y="1447118"/>
+            <a:ext cx="1696597" cy="45719"/>
+          </a:xfrm>
+          <a:prstGeom prst="rect">
+            <a:avLst/>
+          </a:prstGeom>
+          <a:solidFill>
+            <a:srgbClr val="FF6600"/>
+          </a:solidFill>
+          <a:ln>
+            <a:noFill/>
+          </a:ln>
+          <a:effectLst/>
+        </p:spPr>
+        <p:style>
+          <a:lnRef idx="1">
+            <a:schemeClr val="accent1"/>
+          </a:lnRef>
+          <a:fillRef idx="3">
+            <a:schemeClr val="accent1"/>
+          </a:fillRef>
+          <a:effectRef idx="2">
+            <a:schemeClr val="accent1"/>
+          </a:effectRef>
+          <a:fontRef idx="minor">
+            <a:schemeClr val="lt1"/>
+          </a:fontRef>
+        </p:style>
+        <p:txBody>
+          <a:bodyPr rtlCol="0" anchor="ctr"/>
+          <a:lstStyle/>
+          <a:p>
+            <a:pPr algn="ctr"/>
+            <a:endParaRPr lang="es-ES"/>
+          </a:p>
+        </p:txBody>
+      </p:sp>
+      <p:sp>
+        <p:nvSpPr>
+          <p:cNvPr id="2" name="CuadroTexto 1">
+            <a:extLst>
+              <a:ext uri="{FF2B5EF4-FFF2-40B4-BE49-F238E27FC236}">
+                <a16:creationId xmlns:a16="http://schemas.microsoft.com/office/drawing/2014/main" id="{085C4C01-85AB-42ED-9FBF-8C70D0B33681}"/>
+              </a:ext>
+            </a:extLst>
+          </p:cNvPr>
+          <p:cNvSpPr txBox="1"/>
+          <p:nvPr/>
+        </p:nvSpPr>
+        <p:spPr>
+          <a:xfrm>
+            <a:off x="2514599" y="3265407"/>
+            <a:ext cx="4114800" cy="307777"/>
+          </a:xfrm>
+          <a:prstGeom prst="rect">
+            <a:avLst/>
+          </a:prstGeom>
+          <a:noFill/>
+        </p:spPr>
+        <p:txBody>
+          <a:bodyPr wrap="square" rtlCol="0">
+            <a:spAutoFit/>
+          </a:bodyPr>
+          <a:lstStyle/>
+          <a:p>
+            <a:pPr algn="ctr"/>
+            <a:r>
+              <a:rPr lang="es-CO" sz="1400" dirty="0">
+                <a:hlinkClick r:id="rId2" action="ppaction://hlinkfile"/>
+              </a:rPr>
+              <a:t>DIAGRAMA RELACIONAL DE JINRO </a:t>
+            </a:r>
+            <a:endParaRPr lang="es-CO" sz="1400" dirty="0"/>
+          </a:p>
+        </p:txBody>
+      </p:sp>
+    </p:spTree>
+    <p:extLst>
+      <p:ext uri="{BB962C8B-B14F-4D97-AF65-F5344CB8AC3E}">
+        <p14:creationId xmlns:p14="http://schemas.microsoft.com/office/powerpoint/2010/main" val="2824221640"/>
+      </p:ext>
+    </p:extLst>
+  </p:cSld>
+  <p:clrMapOvr>
+    <a:masterClrMapping/>
+  </p:clrMapOvr>
+  <mc:AlternateContent xmlns:mc="http://schemas.openxmlformats.org/markup-compatibility/2006" xmlns:p14="http://schemas.microsoft.com/office/powerpoint/2010/main">
+    <mc:Choice Requires="p14">
+      <p:transition spd="med" p14:dur="700">
+        <p:fade/>
+      </p:transition>
+    </mc:Choice>
+    <mc:Fallback xmlns="">
+      <p:transition spd="med">
+        <p:fade/>
+      </p:transition>
+    </mc:Fallback>
+  </mc:AlternateContent>
+</p:sld>
+</file>
+
+<file path=ppt/slides/slide31.xml><?xml version="1.0" encoding="utf-8"?>
+<p:sld xmlns:a="http://schemas.openxmlformats.org/drawingml/2006/main" xmlns:r="http://schemas.openxmlformats.org/officeDocument/2006/relationships" xmlns:p="http://schemas.openxmlformats.org/presentationml/2006/main">
+  <p:cSld>
+    <p:spTree>
+      <p:nvGrpSpPr>
+        <p:cNvPr id="1" name=""/>
+        <p:cNvGrpSpPr/>
+        <p:nvPr/>
+      </p:nvGrpSpPr>
+      <p:grpSpPr>
+        <a:xfrm>
+          <a:off x="0" y="0"/>
+          <a:ext cx="0" cy="0"/>
+          <a:chOff x="0" y="0"/>
+          <a:chExt cx="0" cy="0"/>
+        </a:xfrm>
+      </p:grpSpPr>
+      <p:sp>
+        <p:nvSpPr>
+          <p:cNvPr id="3" name="CuadroTexto 2">
+            <a:extLst>
+              <a:ext uri="{FF2B5EF4-FFF2-40B4-BE49-F238E27FC236}">
+                <a16:creationId xmlns:a16="http://schemas.microsoft.com/office/drawing/2014/main" id="{F9DF0B84-F293-4628-B89D-1F4622DFECE2}"/>
+              </a:ext>
+            </a:extLst>
+          </p:cNvPr>
+          <p:cNvSpPr txBox="1"/>
+          <p:nvPr/>
+        </p:nvSpPr>
+        <p:spPr>
+          <a:xfrm>
+            <a:off x="2286000" y="123679"/>
+            <a:ext cx="4572000" cy="1323439"/>
+          </a:xfrm>
+          <a:prstGeom prst="rect">
+            <a:avLst/>
+          </a:prstGeom>
+          <a:noFill/>
+        </p:spPr>
+        <p:txBody>
+          <a:bodyPr wrap="square">
+            <a:spAutoFit/>
+          </a:bodyPr>
+          <a:lstStyle/>
+          <a:p>
+            <a:pPr algn="ctr"/>
+            <a:r>
+              <a:rPr lang="es-CO" sz="4000" b="1" dirty="0">
+                <a:solidFill>
+                  <a:schemeClr val="tx1">
+                    <a:lumMod val="75000"/>
+                    <a:lumOff val="25000"/>
+                  </a:schemeClr>
+                </a:solidFill>
+              </a:rPr>
+              <a:t>DICCIONARIO DE DATOS</a:t>
+            </a:r>
+            <a:endParaRPr lang="es-CO" sz="4000" dirty="0"/>
+          </a:p>
+        </p:txBody>
+      </p:sp>
+      <p:sp>
+        <p:nvSpPr>
+          <p:cNvPr id="4" name="Rectángulo 3">
+            <a:extLst>
+              <a:ext uri="{FF2B5EF4-FFF2-40B4-BE49-F238E27FC236}">
+                <a16:creationId xmlns:a16="http://schemas.microsoft.com/office/drawing/2014/main" id="{94A65BCD-E6D4-4144-B7D1-7D0C8FFA6564}"/>
+              </a:ext>
+            </a:extLst>
+          </p:cNvPr>
+          <p:cNvSpPr/>
+          <p:nvPr/>
+        </p:nvSpPr>
+        <p:spPr>
+          <a:xfrm flipV="1">
+            <a:off x="3723701" y="1447118"/>
+            <a:ext cx="1696597" cy="45719"/>
+          </a:xfrm>
+          <a:prstGeom prst="rect">
+            <a:avLst/>
+          </a:prstGeom>
+          <a:solidFill>
+            <a:srgbClr val="FF6600"/>
+          </a:solidFill>
+          <a:ln>
+            <a:noFill/>
+          </a:ln>
+          <a:effectLst/>
+        </p:spPr>
+        <p:style>
+          <a:lnRef idx="1">
+            <a:schemeClr val="accent1"/>
+          </a:lnRef>
+          <a:fillRef idx="3">
+            <a:schemeClr val="accent1"/>
+          </a:fillRef>
+          <a:effectRef idx="2">
+            <a:schemeClr val="accent1"/>
+          </a:effectRef>
+          <a:fontRef idx="minor">
+            <a:schemeClr val="lt1"/>
+          </a:fontRef>
+        </p:style>
+        <p:txBody>
+          <a:bodyPr rtlCol="0" anchor="ctr"/>
+          <a:lstStyle/>
+          <a:p>
+            <a:pPr algn="ctr"/>
+            <a:endParaRPr lang="es-ES"/>
+          </a:p>
+        </p:txBody>
+      </p:sp>
+      <p:sp>
+        <p:nvSpPr>
+          <p:cNvPr id="2" name="CuadroTexto 1">
+            <a:extLst>
+              <a:ext uri="{FF2B5EF4-FFF2-40B4-BE49-F238E27FC236}">
+                <a16:creationId xmlns:a16="http://schemas.microsoft.com/office/drawing/2014/main" id="{085C4C01-85AB-42ED-9FBF-8C70D0B33681}"/>
+              </a:ext>
+            </a:extLst>
+          </p:cNvPr>
+          <p:cNvSpPr txBox="1"/>
+          <p:nvPr/>
+        </p:nvSpPr>
+        <p:spPr>
+          <a:xfrm>
+            <a:off x="2514599" y="3265407"/>
+            <a:ext cx="4114800" cy="307777"/>
+          </a:xfrm>
+          <a:prstGeom prst="rect">
+            <a:avLst/>
+          </a:prstGeom>
+          <a:noFill/>
+        </p:spPr>
+        <p:txBody>
+          <a:bodyPr wrap="square" rtlCol="0">
+            <a:spAutoFit/>
+          </a:bodyPr>
+          <a:lstStyle/>
+          <a:p>
+            <a:pPr algn="ctr"/>
+            <a:r>
+              <a:rPr lang="es-CO" sz="1400" dirty="0">
+                <a:hlinkClick r:id="rId2" action="ppaction://hlinkfile"/>
+              </a:rPr>
+              <a:t>DICCIONARIO DE DATOS  </a:t>
+            </a:r>
+            <a:endParaRPr lang="es-CO" sz="1400" dirty="0"/>
+          </a:p>
+        </p:txBody>
+      </p:sp>
+    </p:spTree>
+    <p:extLst>
+      <p:ext uri="{BB962C8B-B14F-4D97-AF65-F5344CB8AC3E}">
+        <p14:creationId xmlns:p14="http://schemas.microsoft.com/office/powerpoint/2010/main" val="3816213677"/>
+      </p:ext>
+    </p:extLst>
+  </p:cSld>
+  <p:clrMapOvr>
+    <a:masterClrMapping/>
+  </p:clrMapOvr>
+  <mc:AlternateContent xmlns:mc="http://schemas.openxmlformats.org/markup-compatibility/2006" xmlns:p14="http://schemas.microsoft.com/office/powerpoint/2010/main">
+    <mc:Choice Requires="p14">
+      <p:transition spd="med" p14:dur="700">
+        <p:fade/>
+      </p:transition>
+    </mc:Choice>
+    <mc:Fallback xmlns="">
+      <p:transition spd="med">
+        <p:fade/>
+      </p:transition>
+    </mc:Fallback>
+  </mc:AlternateContent>
+</p:sld>
+</file>
+
+<file path=ppt/slides/slide32.xml><?xml version="1.0" encoding="utf-8"?>
+<p:sld xmlns:a="http://schemas.openxmlformats.org/drawingml/2006/main" xmlns:r="http://schemas.openxmlformats.org/officeDocument/2006/relationships" xmlns:p="http://schemas.openxmlformats.org/presentationml/2006/main">
+  <p:cSld>
+    <p:spTree>
+      <p:nvGrpSpPr>
+        <p:cNvPr id="1" name=""/>
+        <p:cNvGrpSpPr/>
+        <p:nvPr/>
+      </p:nvGrpSpPr>
+      <p:grpSpPr>
+        <a:xfrm>
+          <a:off x="0" y="0"/>
+          <a:ext cx="0" cy="0"/>
+          <a:chOff x="0" y="0"/>
+          <a:chExt cx="0" cy="0"/>
+        </a:xfrm>
+      </p:grpSpPr>
+      <p:sp>
+        <p:nvSpPr>
+          <p:cNvPr id="3" name="CuadroTexto 2">
+            <a:extLst>
+              <a:ext uri="{FF2B5EF4-FFF2-40B4-BE49-F238E27FC236}">
+                <a16:creationId xmlns:a16="http://schemas.microsoft.com/office/drawing/2014/main" id="{F9DF0B84-F293-4628-B89D-1F4622DFECE2}"/>
+              </a:ext>
+            </a:extLst>
+          </p:cNvPr>
+          <p:cNvSpPr txBox="1"/>
+          <p:nvPr/>
+        </p:nvSpPr>
+        <p:spPr>
+          <a:xfrm>
+            <a:off x="2286000" y="123679"/>
+            <a:ext cx="4572000" cy="707886"/>
+          </a:xfrm>
+          <a:prstGeom prst="rect">
+            <a:avLst/>
+          </a:prstGeom>
+          <a:noFill/>
+        </p:spPr>
+        <p:txBody>
+          <a:bodyPr wrap="square">
+            <a:spAutoFit/>
+          </a:bodyPr>
+          <a:lstStyle/>
+          <a:p>
+            <a:pPr algn="ctr"/>
+            <a:r>
+              <a:rPr lang="es-CO" sz="4000" b="1" dirty="0">
+                <a:solidFill>
+                  <a:schemeClr val="tx1">
+                    <a:lumMod val="75000"/>
+                    <a:lumOff val="25000"/>
+                  </a:schemeClr>
+                </a:solidFill>
+              </a:rPr>
+              <a:t>NORMALIZACIÓN</a:t>
+            </a:r>
+            <a:endParaRPr lang="es-CO" sz="4000" dirty="0"/>
+          </a:p>
+        </p:txBody>
+      </p:sp>
+      <p:sp>
+        <p:nvSpPr>
+          <p:cNvPr id="4" name="Rectángulo 3">
+            <a:extLst>
+              <a:ext uri="{FF2B5EF4-FFF2-40B4-BE49-F238E27FC236}">
+                <a16:creationId xmlns:a16="http://schemas.microsoft.com/office/drawing/2014/main" id="{94A65BCD-E6D4-4144-B7D1-7D0C8FFA6564}"/>
+              </a:ext>
+            </a:extLst>
+          </p:cNvPr>
+          <p:cNvSpPr/>
+          <p:nvPr/>
+        </p:nvSpPr>
+        <p:spPr>
+          <a:xfrm flipV="1">
+            <a:off x="3723701" y="1447118"/>
+            <a:ext cx="1696597" cy="45719"/>
+          </a:xfrm>
+          <a:prstGeom prst="rect">
+            <a:avLst/>
+          </a:prstGeom>
+          <a:solidFill>
+            <a:srgbClr val="FF6600"/>
+          </a:solidFill>
+          <a:ln>
+            <a:noFill/>
+          </a:ln>
+          <a:effectLst/>
+        </p:spPr>
+        <p:style>
+          <a:lnRef idx="1">
+            <a:schemeClr val="accent1"/>
+          </a:lnRef>
+          <a:fillRef idx="3">
+            <a:schemeClr val="accent1"/>
+          </a:fillRef>
+          <a:effectRef idx="2">
+            <a:schemeClr val="accent1"/>
+          </a:effectRef>
+          <a:fontRef idx="minor">
+            <a:schemeClr val="lt1"/>
+          </a:fontRef>
+        </p:style>
+        <p:txBody>
+          <a:bodyPr rtlCol="0" anchor="ctr"/>
+          <a:lstStyle/>
+          <a:p>
+            <a:pPr algn="ctr"/>
+            <a:endParaRPr lang="es-ES"/>
+          </a:p>
+        </p:txBody>
+      </p:sp>
+      <p:sp>
+        <p:nvSpPr>
+          <p:cNvPr id="2" name="CuadroTexto 1">
+            <a:extLst>
+              <a:ext uri="{FF2B5EF4-FFF2-40B4-BE49-F238E27FC236}">
+                <a16:creationId xmlns:a16="http://schemas.microsoft.com/office/drawing/2014/main" id="{085C4C01-85AB-42ED-9FBF-8C70D0B33681}"/>
+              </a:ext>
+            </a:extLst>
+          </p:cNvPr>
+          <p:cNvSpPr txBox="1"/>
+          <p:nvPr/>
+        </p:nvSpPr>
+        <p:spPr>
+          <a:xfrm>
+            <a:off x="2514599" y="3265407"/>
+            <a:ext cx="4114800" cy="307777"/>
+          </a:xfrm>
+          <a:prstGeom prst="rect">
+            <a:avLst/>
+          </a:prstGeom>
+          <a:noFill/>
+        </p:spPr>
+        <p:txBody>
+          <a:bodyPr wrap="square" rtlCol="0">
+            <a:spAutoFit/>
+          </a:bodyPr>
+          <a:lstStyle/>
+          <a:p>
+            <a:pPr algn="ctr"/>
+            <a:r>
+              <a:rPr lang="es-CO" sz="1400" dirty="0">
+                <a:hlinkClick r:id="rId2" action="ppaction://hlinkfile"/>
+              </a:rPr>
+              <a:t>NORMALIZACIÓN</a:t>
+            </a:r>
+            <a:endParaRPr lang="es-CO" sz="1400" dirty="0"/>
+          </a:p>
+        </p:txBody>
+      </p:sp>
+    </p:spTree>
+    <p:extLst>
+      <p:ext uri="{BB962C8B-B14F-4D97-AF65-F5344CB8AC3E}">
+        <p14:creationId xmlns:p14="http://schemas.microsoft.com/office/powerpoint/2010/main" val="3676868754"/>
+      </p:ext>
+    </p:extLst>
+  </p:cSld>
+  <p:clrMapOvr>
+    <a:masterClrMapping/>
+  </p:clrMapOvr>
+  <mc:AlternateContent xmlns:mc="http://schemas.openxmlformats.org/markup-compatibility/2006" xmlns:p14="http://schemas.microsoft.com/office/powerpoint/2010/main">
+    <mc:Choice Requires="p14">
+      <p:transition spd="med" p14:dur="700">
+        <p:fade/>
+      </p:transition>
+    </mc:Choice>
+    <mc:Fallback xmlns="">
+      <p:transition spd="med">
+        <p:fade/>
+      </p:transition>
+    </mc:Fallback>
+  </mc:AlternateContent>
+</p:sld>
+</file>
+
+<file path=ppt/slides/slide33.xml><?xml version="1.0" encoding="utf-8"?>
+<p:sld xmlns:a="http://schemas.openxmlformats.org/drawingml/2006/main" xmlns:r="http://schemas.openxmlformats.org/officeDocument/2006/relationships" xmlns:p="http://schemas.openxmlformats.org/presentationml/2006/main">
+  <p:cSld>
+    <p:spTree>
+      <p:nvGrpSpPr>
+        <p:cNvPr id="1" name=""/>
+        <p:cNvGrpSpPr/>
+        <p:nvPr/>
+      </p:nvGrpSpPr>
+      <p:grpSpPr>
+        <a:xfrm>
+          <a:off x="0" y="0"/>
+          <a:ext cx="0" cy="0"/>
+          <a:chOff x="0" y="0"/>
+          <a:chExt cx="0" cy="0"/>
+        </a:xfrm>
+      </p:grpSpPr>
+      <p:sp>
+        <p:nvSpPr>
+          <p:cNvPr id="3" name="CuadroTexto 2">
+            <a:extLst>
+              <a:ext uri="{FF2B5EF4-FFF2-40B4-BE49-F238E27FC236}">
+                <a16:creationId xmlns:a16="http://schemas.microsoft.com/office/drawing/2014/main" id="{F9DF0B84-F293-4628-B89D-1F4622DFECE2}"/>
+              </a:ext>
+            </a:extLst>
+          </p:cNvPr>
+          <p:cNvSpPr txBox="1"/>
+          <p:nvPr/>
+        </p:nvSpPr>
+        <p:spPr>
+          <a:xfrm>
+            <a:off x="2286000" y="123679"/>
+            <a:ext cx="4572000" cy="1323439"/>
+          </a:xfrm>
+          <a:prstGeom prst="rect">
+            <a:avLst/>
+          </a:prstGeom>
+          <a:noFill/>
+        </p:spPr>
+        <p:txBody>
+          <a:bodyPr wrap="square">
+            <a:spAutoFit/>
+          </a:bodyPr>
+          <a:lstStyle/>
+          <a:p>
+            <a:pPr algn="ctr"/>
+            <a:r>
+              <a:rPr lang="es-CO" sz="4000" b="1" dirty="0">
+                <a:solidFill>
+                  <a:schemeClr val="tx1">
+                    <a:lumMod val="75000"/>
+                    <a:lumOff val="25000"/>
+                  </a:schemeClr>
+                </a:solidFill>
+              </a:rPr>
+              <a:t>DIAGRAMA DE DISTRIBUCIÓN </a:t>
+            </a:r>
+            <a:endParaRPr lang="es-CO" sz="4000" dirty="0"/>
+          </a:p>
+        </p:txBody>
+      </p:sp>
+      <p:sp>
+        <p:nvSpPr>
+          <p:cNvPr id="4" name="Rectángulo 3">
+            <a:extLst>
+              <a:ext uri="{FF2B5EF4-FFF2-40B4-BE49-F238E27FC236}">
+                <a16:creationId xmlns:a16="http://schemas.microsoft.com/office/drawing/2014/main" id="{94A65BCD-E6D4-4144-B7D1-7D0C8FFA6564}"/>
+              </a:ext>
+            </a:extLst>
+          </p:cNvPr>
+          <p:cNvSpPr/>
+          <p:nvPr/>
+        </p:nvSpPr>
+        <p:spPr>
+          <a:xfrm flipV="1">
+            <a:off x="3723701" y="1447118"/>
+            <a:ext cx="1696597" cy="45719"/>
+          </a:xfrm>
+          <a:prstGeom prst="rect">
+            <a:avLst/>
+          </a:prstGeom>
+          <a:solidFill>
+            <a:srgbClr val="FF6600"/>
+          </a:solidFill>
+          <a:ln>
+            <a:noFill/>
+          </a:ln>
+          <a:effectLst/>
+        </p:spPr>
+        <p:style>
+          <a:lnRef idx="1">
+            <a:schemeClr val="accent1"/>
+          </a:lnRef>
+          <a:fillRef idx="3">
+            <a:schemeClr val="accent1"/>
+          </a:fillRef>
+          <a:effectRef idx="2">
+            <a:schemeClr val="accent1"/>
+          </a:effectRef>
+          <a:fontRef idx="minor">
+            <a:schemeClr val="lt1"/>
+          </a:fontRef>
+        </p:style>
+        <p:txBody>
+          <a:bodyPr rtlCol="0" anchor="ctr"/>
+          <a:lstStyle/>
+          <a:p>
+            <a:pPr algn="ctr"/>
+            <a:endParaRPr lang="es-ES"/>
+          </a:p>
+        </p:txBody>
+      </p:sp>
+      <p:sp>
+        <p:nvSpPr>
+          <p:cNvPr id="2" name="CuadroTexto 1">
+            <a:extLst>
+              <a:ext uri="{FF2B5EF4-FFF2-40B4-BE49-F238E27FC236}">
+                <a16:creationId xmlns:a16="http://schemas.microsoft.com/office/drawing/2014/main" id="{085C4C01-85AB-42ED-9FBF-8C70D0B33681}"/>
+              </a:ext>
+            </a:extLst>
+          </p:cNvPr>
+          <p:cNvSpPr txBox="1"/>
+          <p:nvPr/>
+        </p:nvSpPr>
+        <p:spPr>
+          <a:xfrm>
+            <a:off x="2514599" y="3265407"/>
+            <a:ext cx="4114800" cy="307777"/>
+          </a:xfrm>
+          <a:prstGeom prst="rect">
+            <a:avLst/>
+          </a:prstGeom>
+          <a:noFill/>
+        </p:spPr>
+        <p:txBody>
+          <a:bodyPr wrap="square" rtlCol="0">
+            <a:spAutoFit/>
+          </a:bodyPr>
+          <a:lstStyle/>
+          <a:p>
+            <a:pPr algn="ctr"/>
+            <a:r>
+              <a:rPr lang="es-CO" sz="1400" dirty="0">
+                <a:hlinkClick r:id="rId2" action="ppaction://hlinkfile"/>
+              </a:rPr>
+              <a:t>DIAGRAMA DE DISTRIBUCIÓN  </a:t>
+            </a:r>
+            <a:endParaRPr lang="es-CO" sz="1400" dirty="0"/>
+          </a:p>
+        </p:txBody>
+      </p:sp>
+    </p:spTree>
+    <p:extLst>
+      <p:ext uri="{BB962C8B-B14F-4D97-AF65-F5344CB8AC3E}">
+        <p14:creationId xmlns:p14="http://schemas.microsoft.com/office/powerpoint/2010/main" val="3192302992"/>
+      </p:ext>
+    </p:extLst>
+  </p:cSld>
+  <p:clrMapOvr>
+    <a:masterClrMapping/>
+  </p:clrMapOvr>
+  <mc:AlternateContent xmlns:mc="http://schemas.openxmlformats.org/markup-compatibility/2006" xmlns:p14="http://schemas.microsoft.com/office/powerpoint/2010/main">
+    <mc:Choice Requires="p14">
+      <p:transition spd="med" p14:dur="700">
+        <p:fade/>
+      </p:transition>
+    </mc:Choice>
+    <mc:Fallback xmlns="">
+      <p:transition spd="med">
+        <p:fade/>
+      </p:transition>
+    </mc:Fallback>
+  </mc:AlternateContent>
+</p:sld>
+</file>
+
+<file path=ppt/slides/slide34.xml><?xml version="1.0" encoding="utf-8"?>
+<p:sld xmlns:a="http://schemas.openxmlformats.org/drawingml/2006/main" xmlns:r="http://schemas.openxmlformats.org/officeDocument/2006/relationships" xmlns:p="http://schemas.openxmlformats.org/presentationml/2006/main">
+  <p:cSld>
+    <p:spTree>
+      <p:nvGrpSpPr>
+        <p:cNvPr id="1" name=""/>
+        <p:cNvGrpSpPr/>
+        <p:nvPr/>
+      </p:nvGrpSpPr>
+      <p:grpSpPr>
+        <a:xfrm>
+          <a:off x="0" y="0"/>
+          <a:ext cx="0" cy="0"/>
+          <a:chOff x="0" y="0"/>
+          <a:chExt cx="0" cy="0"/>
+        </a:xfrm>
+      </p:grpSpPr>
+    </p:spTree>
+    <p:extLst>
+      <p:ext uri="{BB962C8B-B14F-4D97-AF65-F5344CB8AC3E}">
+        <p14:creationId xmlns:p14="http://schemas.microsoft.com/office/powerpoint/2010/main" val="3181596749"/>
+      </p:ext>
+    </p:extLst>
+  </p:cSld>
+  <p:clrMapOvr>
+    <a:masterClrMapping/>
+  </p:clrMapOvr>
+  <mc:AlternateContent xmlns:mc="http://schemas.openxmlformats.org/markup-compatibility/2006" xmlns:p14="http://schemas.microsoft.com/office/powerpoint/2010/main">
+    <mc:Choice Requires="p14">
+      <p:transition spd="med" p14:dur="700">
+        <p:fade/>
+      </p:transition>
+    </mc:Choice>
+    <mc:Fallback xmlns="">
+      <p:transition spd="med">
+        <p:fade/>
+      </p:transition>
+    </mc:Fallback>
+  </mc:AlternateContent>
 </p:sld>
 </file>
 

</xml_diff>